<commit_message>
Finalized OOP lection and examples
</commit_message>
<xml_diff>
--- a/13.oop-in-php.pptx
+++ b/13.oop-in-php.pptx
@@ -5,7 +5,7 @@
     <p:sldMasterId id="2147483660" r:id="rId1"/>
   </p:sldMasterIdLst>
   <p:notesMasterIdLst>
-    <p:notesMasterId r:id="rId12"/>
+    <p:notesMasterId r:id="rId22"/>
   </p:notesMasterIdLst>
   <p:sldIdLst>
     <p:sldId id="256" r:id="rId2"/>
@@ -18,6 +18,16 @@
     <p:sldId id="263" r:id="rId9"/>
     <p:sldId id="264" r:id="rId10"/>
     <p:sldId id="265" r:id="rId11"/>
+    <p:sldId id="266" r:id="rId12"/>
+    <p:sldId id="267" r:id="rId13"/>
+    <p:sldId id="268" r:id="rId14"/>
+    <p:sldId id="269" r:id="rId15"/>
+    <p:sldId id="270" r:id="rId16"/>
+    <p:sldId id="271" r:id="rId17"/>
+    <p:sldId id="272" r:id="rId18"/>
+    <p:sldId id="273" r:id="rId19"/>
+    <p:sldId id="274" r:id="rId20"/>
+    <p:sldId id="275" r:id="rId21"/>
   </p:sldIdLst>
   <p:sldSz cx="12192000" cy="6858000"/>
   <p:notesSz cx="6858000" cy="9144000"/>
@@ -206,7 +216,7 @@
           <a:p>
             <a:fld id="{77FC3B86-2742-46E2-A44D-1FAB0C668CD5}" type="datetimeFigureOut">
               <a:rPr lang="en-US" smtClean="0"/>
-              <a:t>1/5/2015</a:t>
+              <a:t>1/6/2015</a:t>
             </a:fld>
             <a:endParaRPr lang="en-US"/>
           </a:p>
@@ -645,7 +655,7 @@
           <a:p>
             <a:fld id="{8E57C33F-FC88-4120-B878-9148FF06A660}" type="datetimeFigureOut">
               <a:rPr lang="en-US" smtClean="0"/>
-              <a:t>1/5/2015</a:t>
+              <a:t>1/6/2015</a:t>
             </a:fld>
             <a:endParaRPr lang="en-US"/>
           </a:p>
@@ -957,7 +967,7 @@
           <a:p>
             <a:fld id="{8E57C33F-FC88-4120-B878-9148FF06A660}" type="datetimeFigureOut">
               <a:rPr lang="en-US" smtClean="0"/>
-              <a:t>1/5/2015</a:t>
+              <a:t>1/6/2015</a:t>
             </a:fld>
             <a:endParaRPr lang="en-US"/>
           </a:p>
@@ -1179,7 +1189,7 @@
           <a:p>
             <a:fld id="{8E57C33F-FC88-4120-B878-9148FF06A660}" type="datetimeFigureOut">
               <a:rPr lang="en-US" smtClean="0"/>
-              <a:t>1/5/2015</a:t>
+              <a:t>1/6/2015</a:t>
             </a:fld>
             <a:endParaRPr lang="en-US"/>
           </a:p>
@@ -1470,7 +1480,7 @@
           <a:p>
             <a:fld id="{8E57C33F-FC88-4120-B878-9148FF06A660}" type="datetimeFigureOut">
               <a:rPr lang="en-US" smtClean="0"/>
-              <a:t>1/5/2015</a:t>
+              <a:t>1/6/2015</a:t>
             </a:fld>
             <a:endParaRPr lang="en-US"/>
           </a:p>
@@ -1924,7 +1934,7 @@
           <a:p>
             <a:fld id="{8E57C33F-FC88-4120-B878-9148FF06A660}" type="datetimeFigureOut">
               <a:rPr lang="en-US" smtClean="0"/>
-              <a:t>1/5/2015</a:t>
+              <a:t>1/6/2015</a:t>
             </a:fld>
             <a:endParaRPr lang="en-US"/>
           </a:p>
@@ -2500,7 +2510,7 @@
           <a:p>
             <a:fld id="{8E57C33F-FC88-4120-B878-9148FF06A660}" type="datetimeFigureOut">
               <a:rPr lang="en-US" smtClean="0"/>
-              <a:t>1/5/2015</a:t>
+              <a:t>1/6/2015</a:t>
             </a:fld>
             <a:endParaRPr lang="en-US"/>
           </a:p>
@@ -3352,7 +3362,7 @@
           <a:p>
             <a:fld id="{8E57C33F-FC88-4120-B878-9148FF06A660}" type="datetimeFigureOut">
               <a:rPr lang="en-US" smtClean="0"/>
-              <a:t>1/5/2015</a:t>
+              <a:t>1/6/2015</a:t>
             </a:fld>
             <a:endParaRPr lang="en-US"/>
           </a:p>
@@ -3557,7 +3567,7 @@
           <a:p>
             <a:fld id="{8E57C33F-FC88-4120-B878-9148FF06A660}" type="datetimeFigureOut">
               <a:rPr lang="en-US" smtClean="0"/>
-              <a:t>1/5/2015</a:t>
+              <a:t>1/6/2015</a:t>
             </a:fld>
             <a:endParaRPr lang="en-US"/>
           </a:p>
@@ -3771,7 +3781,7 @@
           <a:p>
             <a:fld id="{8E57C33F-FC88-4120-B878-9148FF06A660}" type="datetimeFigureOut">
               <a:rPr lang="en-US" smtClean="0"/>
-              <a:t>1/5/2015</a:t>
+              <a:t>1/6/2015</a:t>
             </a:fld>
             <a:endParaRPr lang="en-US"/>
           </a:p>
@@ -3976,7 +3986,7 @@
           <a:p>
             <a:fld id="{8E57C33F-FC88-4120-B878-9148FF06A660}" type="datetimeFigureOut">
               <a:rPr lang="en-US" smtClean="0"/>
-              <a:t>1/5/2015</a:t>
+              <a:t>1/6/2015</a:t>
             </a:fld>
             <a:endParaRPr lang="en-US"/>
           </a:p>
@@ -4256,7 +4266,7 @@
           <a:p>
             <a:fld id="{8E57C33F-FC88-4120-B878-9148FF06A660}" type="datetimeFigureOut">
               <a:rPr lang="en-US" smtClean="0"/>
-              <a:t>1/5/2015</a:t>
+              <a:t>1/6/2015</a:t>
             </a:fld>
             <a:endParaRPr lang="en-US"/>
           </a:p>
@@ -4523,7 +4533,7 @@
           <a:p>
             <a:fld id="{8E57C33F-FC88-4120-B878-9148FF06A660}" type="datetimeFigureOut">
               <a:rPr lang="en-US" smtClean="0"/>
-              <a:t>1/5/2015</a:t>
+              <a:t>1/6/2015</a:t>
             </a:fld>
             <a:endParaRPr lang="en-US"/>
           </a:p>
@@ -4938,7 +4948,7 @@
           <a:p>
             <a:fld id="{8E57C33F-FC88-4120-B878-9148FF06A660}" type="datetimeFigureOut">
               <a:rPr lang="en-US" smtClean="0"/>
-              <a:t>1/5/2015</a:t>
+              <a:t>1/6/2015</a:t>
             </a:fld>
             <a:endParaRPr lang="en-US"/>
           </a:p>
@@ -5086,7 +5096,7 @@
           <a:p>
             <a:fld id="{8E57C33F-FC88-4120-B878-9148FF06A660}" type="datetimeFigureOut">
               <a:rPr lang="en-US" smtClean="0"/>
-              <a:t>1/5/2015</a:t>
+              <a:t>1/6/2015</a:t>
             </a:fld>
             <a:endParaRPr lang="en-US"/>
           </a:p>
@@ -5211,7 +5221,7 @@
           <a:p>
             <a:fld id="{8E57C33F-FC88-4120-B878-9148FF06A660}" type="datetimeFigureOut">
               <a:rPr lang="en-US" smtClean="0"/>
-              <a:t>1/5/2015</a:t>
+              <a:t>1/6/2015</a:t>
             </a:fld>
             <a:endParaRPr lang="en-US"/>
           </a:p>
@@ -5490,7 +5500,7 @@
           <a:p>
             <a:fld id="{8E57C33F-FC88-4120-B878-9148FF06A660}" type="datetimeFigureOut">
               <a:rPr lang="en-US" smtClean="0"/>
-              <a:t>1/5/2015</a:t>
+              <a:t>1/6/2015</a:t>
             </a:fld>
             <a:endParaRPr lang="en-US"/>
           </a:p>
@@ -5802,7 +5812,7 @@
           <a:p>
             <a:fld id="{8E57C33F-FC88-4120-B878-9148FF06A660}" type="datetimeFigureOut">
               <a:rPr lang="en-US" smtClean="0"/>
-              <a:t>1/5/2015</a:t>
+              <a:t>1/6/2015</a:t>
             </a:fld>
             <a:endParaRPr lang="en-US"/>
           </a:p>
@@ -6055,7 +6065,7 @@
           <a:p>
             <a:fld id="{8E57C33F-FC88-4120-B878-9148FF06A660}" type="datetimeFigureOut">
               <a:rPr lang="en-US" smtClean="0"/>
-              <a:t>1/5/2015</a:t>
+              <a:t>1/6/2015</a:t>
             </a:fld>
             <a:endParaRPr lang="en-US"/>
           </a:p>
@@ -6583,7 +6593,19 @@
           <a:bodyPr/>
           <a:lstStyle/>
           <a:p>
-            <a:endParaRPr lang="en-US"/>
+            <a:r>
+              <a:rPr lang="bg-BG" dirty="0"/>
+              <a:t>Константи в</a:t>
+            </a:r>
+            <a:r>
+              <a:rPr lang="en-US" dirty="0"/>
+              <a:t> </a:t>
+            </a:r>
+            <a:r>
+              <a:rPr lang="en-US" dirty="0" smtClean="0"/>
+              <a:t>PHP</a:t>
+            </a:r>
+            <a:endParaRPr lang="en-US" dirty="0"/>
           </a:p>
         </p:txBody>
       </p:sp>
@@ -6599,10 +6621,102 @@
         </p:nvSpPr>
         <p:spPr/>
         <p:txBody>
-          <a:bodyPr/>
-          <a:lstStyle/>
-          <a:p>
-            <a:endParaRPr lang="en-US"/>
+          <a:bodyPr>
+            <a:normAutofit/>
+          </a:bodyPr>
+          <a:lstStyle/>
+          <a:p>
+            <a:r>
+              <a:rPr lang="bg-BG" dirty="0"/>
+              <a:t>Константите в </a:t>
+            </a:r>
+            <a:r>
+              <a:rPr lang="en-US" dirty="0" smtClean="0"/>
+              <a:t>PHP </a:t>
+            </a:r>
+            <a:r>
+              <a:rPr lang="bg-BG" dirty="0" smtClean="0"/>
+              <a:t>представят </a:t>
+            </a:r>
+            <a:r>
+              <a:rPr lang="bg-BG" dirty="0"/>
+              <a:t>променливи чиито стойности не се променят по време на изпълнение на </a:t>
+            </a:r>
+            <a:r>
+              <a:rPr lang="bg-BG" dirty="0" smtClean="0"/>
+              <a:t>програмата</a:t>
+            </a:r>
+            <a:endParaRPr lang="en-US" dirty="0" smtClean="0"/>
+          </a:p>
+          <a:p>
+            <a:r>
+              <a:rPr lang="bg-BG" dirty="0" smtClean="0"/>
+              <a:t>В </a:t>
+            </a:r>
+            <a:r>
+              <a:rPr lang="en-US" dirty="0" err="1" smtClean="0"/>
+              <a:t>php</a:t>
+            </a:r>
+            <a:r>
+              <a:rPr lang="en-US" dirty="0" smtClean="0"/>
+              <a:t> </a:t>
+            </a:r>
+            <a:r>
+              <a:rPr lang="bg-BG" dirty="0" smtClean="0"/>
+              <a:t>съществуват 2 вида константи:</a:t>
+            </a:r>
+          </a:p>
+          <a:p>
+            <a:pPr marL="457200" indent="-457200">
+              <a:buAutoNum type="arabicParenR"/>
+            </a:pPr>
+            <a:r>
+              <a:rPr lang="bg-BG" dirty="0" smtClean="0"/>
+              <a:t>Константи отнасящи се за определен клас – дефинират се с ключовата дума </a:t>
+            </a:r>
+            <a:r>
+              <a:rPr lang="en-US" dirty="0" err="1" smtClean="0"/>
+              <a:t>const</a:t>
+            </a:r>
+            <a:endParaRPr lang="en-US" dirty="0" smtClean="0"/>
+          </a:p>
+          <a:p>
+            <a:pPr marL="457200" indent="-457200">
+              <a:buAutoNum type="arabicParenR"/>
+            </a:pPr>
+            <a:r>
+              <a:rPr lang="bg-BG" dirty="0" smtClean="0"/>
+              <a:t>Константи отнасящи се </a:t>
+            </a:r>
+            <a:r>
+              <a:rPr lang="bg-BG" dirty="0" smtClean="0"/>
+              <a:t>за</a:t>
+            </a:r>
+            <a:r>
+              <a:rPr lang="en-US" dirty="0" smtClean="0"/>
+              <a:t> </a:t>
+            </a:r>
+            <a:r>
+              <a:rPr lang="bg-BG" dirty="0" smtClean="0"/>
+              <a:t>целият </a:t>
+            </a:r>
+            <a:r>
+              <a:rPr lang="en-US" dirty="0" err="1" smtClean="0"/>
+              <a:t>Php</a:t>
+            </a:r>
+            <a:r>
+              <a:rPr lang="en-US" dirty="0" smtClean="0"/>
+              <a:t> </a:t>
+            </a:r>
+            <a:r>
+              <a:rPr lang="bg-BG" dirty="0" smtClean="0"/>
+              <a:t>скрипт – дефинират се с помощта на функцията </a:t>
+            </a:r>
+            <a:r>
+              <a:rPr lang="en-US" dirty="0" smtClean="0"/>
+              <a:t>define</a:t>
+            </a:r>
+            <a:endParaRPr lang="en-US" dirty="0"/>
           </a:p>
         </p:txBody>
       </p:sp>
@@ -6610,6 +6724,1144 @@
     <p:extLst>
       <p:ext uri="{BB962C8B-B14F-4D97-AF65-F5344CB8AC3E}">
         <p14:creationId xmlns:p14="http://schemas.microsoft.com/office/powerpoint/2010/main" val="3724248362"/>
+      </p:ext>
+    </p:extLst>
+  </p:cSld>
+  <p:clrMapOvr>
+    <a:masterClrMapping/>
+  </p:clrMapOvr>
+</p:sld>
+</file>
+
+<file path=ppt/slides/slide11.xml><?xml version="1.0" encoding="utf-8"?>
+<p:sld xmlns:a="http://schemas.openxmlformats.org/drawingml/2006/main" xmlns:r="http://schemas.openxmlformats.org/officeDocument/2006/relationships" xmlns:p="http://schemas.openxmlformats.org/presentationml/2006/main">
+  <p:cSld>
+    <p:spTree>
+      <p:nvGrpSpPr>
+        <p:cNvPr id="1" name=""/>
+        <p:cNvGrpSpPr/>
+        <p:nvPr/>
+      </p:nvGrpSpPr>
+      <p:grpSpPr>
+        <a:xfrm>
+          <a:off x="0" y="0"/>
+          <a:ext cx="0" cy="0"/>
+          <a:chOff x="0" y="0"/>
+          <a:chExt cx="0" cy="0"/>
+        </a:xfrm>
+      </p:grpSpPr>
+      <p:sp>
+        <p:nvSpPr>
+          <p:cNvPr id="2" name="Title 1"/>
+          <p:cNvSpPr>
+            <a:spLocks noGrp="1"/>
+          </p:cNvSpPr>
+          <p:nvPr>
+            <p:ph type="title"/>
+          </p:nvPr>
+        </p:nvSpPr>
+        <p:spPr/>
+        <p:txBody>
+          <a:bodyPr/>
+          <a:lstStyle/>
+          <a:p>
+            <a:r>
+              <a:rPr lang="bg-BG" dirty="0"/>
+              <a:t>Константи в</a:t>
+            </a:r>
+            <a:r>
+              <a:rPr lang="en-US" dirty="0"/>
+              <a:t> </a:t>
+            </a:r>
+            <a:r>
+              <a:rPr lang="en-US" dirty="0" smtClean="0"/>
+              <a:t>PHP</a:t>
+            </a:r>
+            <a:endParaRPr lang="en-US" dirty="0"/>
+          </a:p>
+        </p:txBody>
+      </p:sp>
+      <p:pic>
+        <p:nvPicPr>
+          <p:cNvPr id="4" name="Picture 2" descr="http://www.ericharshbarger.org/dice/math_constants.jpg"/>
+          <p:cNvPicPr>
+            <a:picLocks noChangeAspect="1" noChangeArrowheads="1"/>
+          </p:cNvPicPr>
+          <p:nvPr/>
+        </p:nvPicPr>
+        <p:blipFill>
+          <a:blip r:embed="rId2">
+            <a:extLst>
+              <a:ext uri="{28A0092B-C50C-407E-A947-70E740481C1C}">
+                <a14:useLocalDpi xmlns:a14="http://schemas.microsoft.com/office/drawing/2010/main" val="0"/>
+              </a:ext>
+            </a:extLst>
+          </a:blip>
+          <a:srcRect/>
+          <a:stretch>
+            <a:fillRect/>
+          </a:stretch>
+        </p:blipFill>
+        <p:spPr bwMode="auto">
+          <a:xfrm>
+            <a:off x="2857183" y="2097088"/>
+            <a:ext cx="6474458" cy="4320188"/>
+          </a:xfrm>
+          <a:prstGeom prst="rect">
+            <a:avLst/>
+          </a:prstGeom>
+          <a:noFill/>
+          <a:extLst>
+            <a:ext uri="{909E8E84-426E-40DD-AFC4-6F175D3DCCD1}">
+              <a14:hiddenFill xmlns:a14="http://schemas.microsoft.com/office/drawing/2010/main">
+                <a:solidFill>
+                  <a:srgbClr val="FFFFFF"/>
+                </a:solidFill>
+              </a14:hiddenFill>
+            </a:ext>
+          </a:extLst>
+        </p:spPr>
+      </p:pic>
+    </p:spTree>
+    <p:extLst>
+      <p:ext uri="{BB962C8B-B14F-4D97-AF65-F5344CB8AC3E}">
+        <p14:creationId xmlns:p14="http://schemas.microsoft.com/office/powerpoint/2010/main" val="2777553784"/>
+      </p:ext>
+    </p:extLst>
+  </p:cSld>
+  <p:clrMapOvr>
+    <a:masterClrMapping/>
+  </p:clrMapOvr>
+</p:sld>
+</file>
+
+<file path=ppt/slides/slide12.xml><?xml version="1.0" encoding="utf-8"?>
+<p:sld xmlns:a="http://schemas.openxmlformats.org/drawingml/2006/main" xmlns:r="http://schemas.openxmlformats.org/officeDocument/2006/relationships" xmlns:p="http://schemas.openxmlformats.org/presentationml/2006/main">
+  <p:cSld>
+    <p:spTree>
+      <p:nvGrpSpPr>
+        <p:cNvPr id="1" name=""/>
+        <p:cNvGrpSpPr/>
+        <p:nvPr/>
+      </p:nvGrpSpPr>
+      <p:grpSpPr>
+        <a:xfrm>
+          <a:off x="0" y="0"/>
+          <a:ext cx="0" cy="0"/>
+          <a:chOff x="0" y="0"/>
+          <a:chExt cx="0" cy="0"/>
+        </a:xfrm>
+      </p:grpSpPr>
+      <p:sp>
+        <p:nvSpPr>
+          <p:cNvPr id="2" name="Title 1"/>
+          <p:cNvSpPr>
+            <a:spLocks noGrp="1"/>
+          </p:cNvSpPr>
+          <p:nvPr>
+            <p:ph type="title"/>
+          </p:nvPr>
+        </p:nvSpPr>
+        <p:spPr/>
+        <p:txBody>
+          <a:bodyPr/>
+          <a:lstStyle/>
+          <a:p>
+            <a:r>
+              <a:rPr lang="bg-BG" dirty="0"/>
+              <a:t>Наследяване </a:t>
+            </a:r>
+            <a:r>
+              <a:rPr lang="en-US" dirty="0" smtClean="0"/>
+              <a:t>PHP</a:t>
+            </a:r>
+            <a:endParaRPr lang="en-US" dirty="0"/>
+          </a:p>
+        </p:txBody>
+      </p:sp>
+      <p:sp>
+        <p:nvSpPr>
+          <p:cNvPr id="3" name="Content Placeholder 2"/>
+          <p:cNvSpPr>
+            <a:spLocks noGrp="1"/>
+          </p:cNvSpPr>
+          <p:nvPr>
+            <p:ph sz="quarter" idx="13"/>
+          </p:nvPr>
+        </p:nvSpPr>
+        <p:spPr/>
+        <p:txBody>
+          <a:bodyPr/>
+          <a:lstStyle/>
+          <a:p>
+            <a:r>
+              <a:rPr lang="bg-BG" dirty="0"/>
+              <a:t>Наследяването е основен принцип на ООП</a:t>
+            </a:r>
+          </a:p>
+          <a:p>
+            <a:r>
+              <a:rPr lang="bg-BG" dirty="0"/>
+              <a:t>Един клас може да наследява друг клас като по този начин наследникът притежава всички членове на базовия клас</a:t>
+            </a:r>
+          </a:p>
+          <a:p>
+            <a:r>
+              <a:rPr lang="bg-BG" dirty="0"/>
+              <a:t>Наследяването се използва като няколко вида обекти притежават общи характеристики но не са напълно еднакви</a:t>
+            </a:r>
+          </a:p>
+          <a:p>
+            <a:r>
+              <a:rPr lang="bg-BG" dirty="0"/>
+              <a:t>В </a:t>
+            </a:r>
+            <a:r>
+              <a:rPr lang="en-US" dirty="0" smtClean="0"/>
+              <a:t>PHP </a:t>
+            </a:r>
+            <a:r>
+              <a:rPr lang="bg-BG" dirty="0" smtClean="0"/>
+              <a:t>един </a:t>
+            </a:r>
+            <a:r>
+              <a:rPr lang="bg-BG" dirty="0"/>
+              <a:t>клас може да има само един базов клас</a:t>
+            </a:r>
+          </a:p>
+          <a:p>
+            <a:r>
+              <a:rPr lang="bg-BG" dirty="0"/>
+              <a:t>Членовете на класа които са </a:t>
+            </a:r>
+            <a:r>
+              <a:rPr lang="en-US" dirty="0"/>
+              <a:t>protected </a:t>
+            </a:r>
+            <a:r>
+              <a:rPr lang="bg-BG" dirty="0"/>
+              <a:t>се виждат от наследниците</a:t>
+            </a:r>
+            <a:endParaRPr lang="en-US" dirty="0"/>
+          </a:p>
+          <a:p>
+            <a:endParaRPr lang="en-US" dirty="0"/>
+          </a:p>
+        </p:txBody>
+      </p:sp>
+    </p:spTree>
+    <p:extLst>
+      <p:ext uri="{BB962C8B-B14F-4D97-AF65-F5344CB8AC3E}">
+        <p14:creationId xmlns:p14="http://schemas.microsoft.com/office/powerpoint/2010/main" val="1945239931"/>
+      </p:ext>
+    </p:extLst>
+  </p:cSld>
+  <p:clrMapOvr>
+    <a:masterClrMapping/>
+  </p:clrMapOvr>
+</p:sld>
+</file>
+
+<file path=ppt/slides/slide13.xml><?xml version="1.0" encoding="utf-8"?>
+<p:sld xmlns:a="http://schemas.openxmlformats.org/drawingml/2006/main" xmlns:r="http://schemas.openxmlformats.org/officeDocument/2006/relationships" xmlns:p="http://schemas.openxmlformats.org/presentationml/2006/main">
+  <p:cSld>
+    <p:spTree>
+      <p:nvGrpSpPr>
+        <p:cNvPr id="1" name=""/>
+        <p:cNvGrpSpPr/>
+        <p:nvPr/>
+      </p:nvGrpSpPr>
+      <p:grpSpPr>
+        <a:xfrm>
+          <a:off x="0" y="0"/>
+          <a:ext cx="0" cy="0"/>
+          <a:chOff x="0" y="0"/>
+          <a:chExt cx="0" cy="0"/>
+        </a:xfrm>
+      </p:grpSpPr>
+      <p:sp>
+        <p:nvSpPr>
+          <p:cNvPr id="2" name="Title 1"/>
+          <p:cNvSpPr>
+            <a:spLocks noGrp="1"/>
+          </p:cNvSpPr>
+          <p:nvPr>
+            <p:ph type="title"/>
+          </p:nvPr>
+        </p:nvSpPr>
+        <p:spPr/>
+        <p:txBody>
+          <a:bodyPr/>
+          <a:lstStyle/>
+          <a:p>
+            <a:r>
+              <a:rPr lang="bg-BG" dirty="0"/>
+              <a:t>Наследяване </a:t>
+            </a:r>
+            <a:r>
+              <a:rPr lang="en-US" dirty="0"/>
+              <a:t>PHP</a:t>
+            </a:r>
+            <a:endParaRPr lang="en-US" dirty="0"/>
+          </a:p>
+        </p:txBody>
+      </p:sp>
+      <p:pic>
+        <p:nvPicPr>
+          <p:cNvPr id="4" name="Picture 2" descr="https://docs.oracle.com/javase/tutorial/figures/java/concepts-bikeHierarchy.gif"/>
+          <p:cNvPicPr>
+            <a:picLocks noGrp="1" noChangeAspect="1" noChangeArrowheads="1"/>
+          </p:cNvPicPr>
+          <p:nvPr>
+            <p:ph sz="quarter" idx="13"/>
+          </p:nvPr>
+        </p:nvPicPr>
+        <p:blipFill>
+          <a:blip r:embed="rId2">
+            <a:extLst>
+              <a:ext uri="{28A0092B-C50C-407E-A947-70E740481C1C}">
+                <a14:useLocalDpi xmlns:a14="http://schemas.microsoft.com/office/drawing/2010/main" val="0"/>
+              </a:ext>
+            </a:extLst>
+          </a:blip>
+          <a:srcRect/>
+          <a:stretch>
+            <a:fillRect/>
+          </a:stretch>
+        </p:blipFill>
+        <p:spPr bwMode="auto">
+          <a:xfrm>
+            <a:off x="4314825" y="2536031"/>
+            <a:ext cx="3562350" cy="3086100"/>
+          </a:xfrm>
+          <a:prstGeom prst="rect">
+            <a:avLst/>
+          </a:prstGeom>
+          <a:noFill/>
+          <a:extLst>
+            <a:ext uri="{909E8E84-426E-40DD-AFC4-6F175D3DCCD1}">
+              <a14:hiddenFill xmlns:a14="http://schemas.microsoft.com/office/drawing/2010/main">
+                <a:solidFill>
+                  <a:srgbClr val="FFFFFF"/>
+                </a:solidFill>
+              </a14:hiddenFill>
+            </a:ext>
+          </a:extLst>
+        </p:spPr>
+      </p:pic>
+    </p:spTree>
+    <p:extLst>
+      <p:ext uri="{BB962C8B-B14F-4D97-AF65-F5344CB8AC3E}">
+        <p14:creationId xmlns:p14="http://schemas.microsoft.com/office/powerpoint/2010/main" val="361834108"/>
+      </p:ext>
+    </p:extLst>
+  </p:cSld>
+  <p:clrMapOvr>
+    <a:masterClrMapping/>
+  </p:clrMapOvr>
+</p:sld>
+</file>
+
+<file path=ppt/slides/slide14.xml><?xml version="1.0" encoding="utf-8"?>
+<p:sld xmlns:a="http://schemas.openxmlformats.org/drawingml/2006/main" xmlns:r="http://schemas.openxmlformats.org/officeDocument/2006/relationships" xmlns:p="http://schemas.openxmlformats.org/presentationml/2006/main">
+  <p:cSld>
+    <p:spTree>
+      <p:nvGrpSpPr>
+        <p:cNvPr id="1" name=""/>
+        <p:cNvGrpSpPr/>
+        <p:nvPr/>
+      </p:nvGrpSpPr>
+      <p:grpSpPr>
+        <a:xfrm>
+          <a:off x="0" y="0"/>
+          <a:ext cx="0" cy="0"/>
+          <a:chOff x="0" y="0"/>
+          <a:chExt cx="0" cy="0"/>
+        </a:xfrm>
+      </p:grpSpPr>
+      <p:sp>
+        <p:nvSpPr>
+          <p:cNvPr id="2" name="Title 1"/>
+          <p:cNvSpPr>
+            <a:spLocks noGrp="1"/>
+          </p:cNvSpPr>
+          <p:nvPr>
+            <p:ph type="title"/>
+          </p:nvPr>
+        </p:nvSpPr>
+        <p:spPr/>
+        <p:txBody>
+          <a:bodyPr/>
+          <a:lstStyle/>
+          <a:p>
+            <a:r>
+              <a:rPr lang="bg-BG" dirty="0" err="1"/>
+              <a:t>ЗАдача</a:t>
+            </a:r>
+            <a:endParaRPr lang="en-US" dirty="0"/>
+          </a:p>
+        </p:txBody>
+      </p:sp>
+      <p:sp>
+        <p:nvSpPr>
+          <p:cNvPr id="3" name="Content Placeholder 2"/>
+          <p:cNvSpPr>
+            <a:spLocks noGrp="1"/>
+          </p:cNvSpPr>
+          <p:nvPr>
+            <p:ph sz="quarter" idx="13"/>
+          </p:nvPr>
+        </p:nvSpPr>
+        <p:spPr/>
+        <p:txBody>
+          <a:bodyPr/>
+          <a:lstStyle/>
+          <a:p>
+            <a:r>
+              <a:rPr lang="bg-BG" dirty="0"/>
+              <a:t>Направете клас </a:t>
+            </a:r>
+            <a:r>
+              <a:rPr lang="en-US" dirty="0"/>
+              <a:t>Employee </a:t>
+            </a:r>
+            <a:r>
+              <a:rPr lang="bg-BG" dirty="0"/>
+              <a:t>който съдържа базовите характеристики за един работник: часове работа на месец и месечна заплата</a:t>
+            </a:r>
+          </a:p>
+          <a:p>
+            <a:r>
+              <a:rPr lang="bg-BG" dirty="0"/>
+              <a:t>Направете клас </a:t>
+            </a:r>
+            <a:r>
+              <a:rPr lang="en-US" dirty="0"/>
+              <a:t>Policeman, </a:t>
+            </a:r>
+            <a:r>
+              <a:rPr lang="bg-BG" dirty="0"/>
+              <a:t>който наследява </a:t>
+            </a:r>
+            <a:r>
+              <a:rPr lang="en-US" dirty="0"/>
+              <a:t>Employee </a:t>
+            </a:r>
+            <a:r>
+              <a:rPr lang="bg-BG" dirty="0"/>
+              <a:t>и добавя поле за полицейския </a:t>
+            </a:r>
+            <a:r>
+              <a:rPr lang="bg-BG" dirty="0" err="1"/>
+              <a:t>ранк</a:t>
+            </a:r>
+            <a:r>
+              <a:rPr lang="bg-BG" dirty="0"/>
+              <a:t> на дадения полицай</a:t>
+            </a:r>
+          </a:p>
+          <a:p>
+            <a:r>
+              <a:rPr lang="bg-BG" dirty="0"/>
+              <a:t>Направете клас </a:t>
+            </a:r>
+            <a:r>
+              <a:rPr lang="en-US" dirty="0"/>
+              <a:t>Doctor</a:t>
+            </a:r>
+            <a:r>
+              <a:rPr lang="bg-BG" dirty="0"/>
+              <a:t>, който наследява </a:t>
+            </a:r>
+            <a:r>
+              <a:rPr lang="en-US" dirty="0"/>
+              <a:t>Employee </a:t>
+            </a:r>
+            <a:r>
+              <a:rPr lang="bg-BG" dirty="0"/>
+              <a:t>и добавя полета за броя нощни и броя целодневни дежурства на месец</a:t>
+            </a:r>
+          </a:p>
+          <a:p>
+            <a:r>
+              <a:rPr lang="bg-BG" dirty="0"/>
+              <a:t>Направете нужните </a:t>
+            </a:r>
+            <a:r>
+              <a:rPr lang="en-US" dirty="0"/>
+              <a:t>get/set </a:t>
+            </a:r>
+            <a:r>
+              <a:rPr lang="bg-BG" dirty="0"/>
+              <a:t>методи както и методи за извеждане на информацията за обектите в конзолата</a:t>
+            </a:r>
+            <a:endParaRPr lang="en-US" dirty="0"/>
+          </a:p>
+          <a:p>
+            <a:endParaRPr lang="en-US" dirty="0"/>
+          </a:p>
+        </p:txBody>
+      </p:sp>
+    </p:spTree>
+    <p:extLst>
+      <p:ext uri="{BB962C8B-B14F-4D97-AF65-F5344CB8AC3E}">
+        <p14:creationId xmlns:p14="http://schemas.microsoft.com/office/powerpoint/2010/main" val="794093485"/>
+      </p:ext>
+    </p:extLst>
+  </p:cSld>
+  <p:clrMapOvr>
+    <a:masterClrMapping/>
+  </p:clrMapOvr>
+</p:sld>
+</file>
+
+<file path=ppt/slides/slide15.xml><?xml version="1.0" encoding="utf-8"?>
+<p:sld xmlns:a="http://schemas.openxmlformats.org/drawingml/2006/main" xmlns:r="http://schemas.openxmlformats.org/officeDocument/2006/relationships" xmlns:p="http://schemas.openxmlformats.org/presentationml/2006/main">
+  <p:cSld>
+    <p:spTree>
+      <p:nvGrpSpPr>
+        <p:cNvPr id="1" name=""/>
+        <p:cNvGrpSpPr/>
+        <p:nvPr/>
+      </p:nvGrpSpPr>
+      <p:grpSpPr>
+        <a:xfrm>
+          <a:off x="0" y="0"/>
+          <a:ext cx="0" cy="0"/>
+          <a:chOff x="0" y="0"/>
+          <a:chExt cx="0" cy="0"/>
+        </a:xfrm>
+      </p:grpSpPr>
+      <p:sp>
+        <p:nvSpPr>
+          <p:cNvPr id="2" name="Title 1"/>
+          <p:cNvSpPr>
+            <a:spLocks noGrp="1"/>
+          </p:cNvSpPr>
+          <p:nvPr>
+            <p:ph type="title"/>
+          </p:nvPr>
+        </p:nvSpPr>
+        <p:spPr/>
+        <p:txBody>
+          <a:bodyPr/>
+          <a:lstStyle/>
+          <a:p>
+            <a:r>
+              <a:rPr lang="bg-BG" dirty="0"/>
+              <a:t>Абстрактни класове и методи</a:t>
+            </a:r>
+            <a:endParaRPr lang="en-US" dirty="0"/>
+          </a:p>
+        </p:txBody>
+      </p:sp>
+      <p:sp>
+        <p:nvSpPr>
+          <p:cNvPr id="3" name="Content Placeholder 2"/>
+          <p:cNvSpPr>
+            <a:spLocks noGrp="1"/>
+          </p:cNvSpPr>
+          <p:nvPr>
+            <p:ph sz="quarter" idx="13"/>
+          </p:nvPr>
+        </p:nvSpPr>
+        <p:spPr/>
+        <p:txBody>
+          <a:bodyPr/>
+          <a:lstStyle/>
+          <a:p>
+            <a:r>
+              <a:rPr lang="bg-BG" dirty="0"/>
+              <a:t>Абстрактните класове представляват класове от които не може да се направи инстанция (обект)</a:t>
+            </a:r>
+          </a:p>
+          <a:p>
+            <a:r>
+              <a:rPr lang="bg-BG" dirty="0"/>
+              <a:t>Използват се за да се наследят от други класове</a:t>
+            </a:r>
+          </a:p>
+          <a:p>
+            <a:r>
+              <a:rPr lang="bg-BG" dirty="0"/>
+              <a:t>Абстрактен метод представлява метод който няма тяло</a:t>
+            </a:r>
+          </a:p>
+          <a:p>
+            <a:r>
+              <a:rPr lang="bg-BG" dirty="0"/>
+              <a:t>Абстрактните методи трябва да бъдат имплементирани от класовете </a:t>
+            </a:r>
+            <a:r>
+              <a:rPr lang="bg-BG" dirty="0" smtClean="0"/>
+              <a:t>на</a:t>
+            </a:r>
+            <a:r>
+              <a:rPr lang="bg-BG" dirty="0"/>
+              <a:t>с</a:t>
+            </a:r>
+            <a:r>
+              <a:rPr lang="bg-BG" dirty="0" smtClean="0"/>
+              <a:t>ледници</a:t>
+            </a:r>
+            <a:endParaRPr lang="bg-BG" dirty="0"/>
+          </a:p>
+          <a:p>
+            <a:r>
+              <a:rPr lang="bg-BG" dirty="0"/>
+              <a:t>Абстрактни методи могат да имат само абстрактните </a:t>
+            </a:r>
+            <a:r>
+              <a:rPr lang="bg-BG" dirty="0" smtClean="0"/>
+              <a:t>класове</a:t>
+            </a:r>
+            <a:endParaRPr lang="en-US" dirty="0"/>
+          </a:p>
+        </p:txBody>
+      </p:sp>
+    </p:spTree>
+    <p:extLst>
+      <p:ext uri="{BB962C8B-B14F-4D97-AF65-F5344CB8AC3E}">
+        <p14:creationId xmlns:p14="http://schemas.microsoft.com/office/powerpoint/2010/main" val="3690888988"/>
+      </p:ext>
+    </p:extLst>
+  </p:cSld>
+  <p:clrMapOvr>
+    <a:masterClrMapping/>
+  </p:clrMapOvr>
+</p:sld>
+</file>
+
+<file path=ppt/slides/slide16.xml><?xml version="1.0" encoding="utf-8"?>
+<p:sld xmlns:a="http://schemas.openxmlformats.org/drawingml/2006/main" xmlns:r="http://schemas.openxmlformats.org/officeDocument/2006/relationships" xmlns:p="http://schemas.openxmlformats.org/presentationml/2006/main">
+  <p:cSld>
+    <p:spTree>
+      <p:nvGrpSpPr>
+        <p:cNvPr id="1" name=""/>
+        <p:cNvGrpSpPr/>
+        <p:nvPr/>
+      </p:nvGrpSpPr>
+      <p:grpSpPr>
+        <a:xfrm>
+          <a:off x="0" y="0"/>
+          <a:ext cx="0" cy="0"/>
+          <a:chOff x="0" y="0"/>
+          <a:chExt cx="0" cy="0"/>
+        </a:xfrm>
+      </p:grpSpPr>
+      <p:sp>
+        <p:nvSpPr>
+          <p:cNvPr id="2" name="Title 1"/>
+          <p:cNvSpPr>
+            <a:spLocks noGrp="1"/>
+          </p:cNvSpPr>
+          <p:nvPr>
+            <p:ph type="title"/>
+          </p:nvPr>
+        </p:nvSpPr>
+        <p:spPr/>
+        <p:txBody>
+          <a:bodyPr/>
+          <a:lstStyle/>
+          <a:p>
+            <a:r>
+              <a:rPr lang="bg-BG" dirty="0"/>
+              <a:t>Абстрактни класове и методи демо</a:t>
+            </a:r>
+            <a:endParaRPr lang="en-US" dirty="0"/>
+          </a:p>
+        </p:txBody>
+      </p:sp>
+      <p:pic>
+        <p:nvPicPr>
+          <p:cNvPr id="4" name="Picture 2" descr="http://i.stack.imgur.com/gXREq.png"/>
+          <p:cNvPicPr>
+            <a:picLocks noChangeAspect="1" noChangeArrowheads="1"/>
+          </p:cNvPicPr>
+          <p:nvPr/>
+        </p:nvPicPr>
+        <p:blipFill>
+          <a:blip r:embed="rId2">
+            <a:extLst>
+              <a:ext uri="{28A0092B-C50C-407E-A947-70E740481C1C}">
+                <a14:useLocalDpi xmlns:a14="http://schemas.microsoft.com/office/drawing/2010/main" val="0"/>
+              </a:ext>
+            </a:extLst>
+          </a:blip>
+          <a:srcRect/>
+          <a:stretch>
+            <a:fillRect/>
+          </a:stretch>
+        </p:blipFill>
+        <p:spPr bwMode="auto">
+          <a:xfrm>
+            <a:off x="2259226" y="2097088"/>
+            <a:ext cx="7670371" cy="4104599"/>
+          </a:xfrm>
+          <a:prstGeom prst="rect">
+            <a:avLst/>
+          </a:prstGeom>
+          <a:noFill/>
+          <a:extLst>
+            <a:ext uri="{909E8E84-426E-40DD-AFC4-6F175D3DCCD1}">
+              <a14:hiddenFill xmlns:a14="http://schemas.microsoft.com/office/drawing/2010/main">
+                <a:solidFill>
+                  <a:srgbClr val="FFFFFF"/>
+                </a:solidFill>
+              </a14:hiddenFill>
+            </a:ext>
+          </a:extLst>
+        </p:spPr>
+      </p:pic>
+    </p:spTree>
+    <p:extLst>
+      <p:ext uri="{BB962C8B-B14F-4D97-AF65-F5344CB8AC3E}">
+        <p14:creationId xmlns:p14="http://schemas.microsoft.com/office/powerpoint/2010/main" val="555703820"/>
+      </p:ext>
+    </p:extLst>
+  </p:cSld>
+  <p:clrMapOvr>
+    <a:masterClrMapping/>
+  </p:clrMapOvr>
+</p:sld>
+</file>
+
+<file path=ppt/slides/slide17.xml><?xml version="1.0" encoding="utf-8"?>
+<p:sld xmlns:a="http://schemas.openxmlformats.org/drawingml/2006/main" xmlns:r="http://schemas.openxmlformats.org/officeDocument/2006/relationships" xmlns:p="http://schemas.openxmlformats.org/presentationml/2006/main">
+  <p:cSld>
+    <p:spTree>
+      <p:nvGrpSpPr>
+        <p:cNvPr id="1" name=""/>
+        <p:cNvGrpSpPr/>
+        <p:nvPr/>
+      </p:nvGrpSpPr>
+      <p:grpSpPr>
+        <a:xfrm>
+          <a:off x="0" y="0"/>
+          <a:ext cx="0" cy="0"/>
+          <a:chOff x="0" y="0"/>
+          <a:chExt cx="0" cy="0"/>
+        </a:xfrm>
+      </p:grpSpPr>
+      <p:sp>
+        <p:nvSpPr>
+          <p:cNvPr id="2" name="Title 1"/>
+          <p:cNvSpPr>
+            <a:spLocks noGrp="1"/>
+          </p:cNvSpPr>
+          <p:nvPr>
+            <p:ph type="title"/>
+          </p:nvPr>
+        </p:nvSpPr>
+        <p:spPr/>
+        <p:txBody>
+          <a:bodyPr/>
+          <a:lstStyle/>
+          <a:p>
+            <a:r>
+              <a:rPr lang="bg-BG" dirty="0" smtClean="0"/>
+              <a:t>Магически методи в </a:t>
+            </a:r>
+            <a:r>
+              <a:rPr lang="en-US" dirty="0" smtClean="0"/>
+              <a:t>PHP</a:t>
+            </a:r>
+            <a:endParaRPr lang="en-US" dirty="0"/>
+          </a:p>
+        </p:txBody>
+      </p:sp>
+      <p:sp>
+        <p:nvSpPr>
+          <p:cNvPr id="3" name="Content Placeholder 2"/>
+          <p:cNvSpPr>
+            <a:spLocks noGrp="1"/>
+          </p:cNvSpPr>
+          <p:nvPr>
+            <p:ph sz="quarter" idx="13"/>
+          </p:nvPr>
+        </p:nvSpPr>
+        <p:spPr/>
+        <p:txBody>
+          <a:bodyPr/>
+          <a:lstStyle/>
+          <a:p>
+            <a:r>
+              <a:rPr lang="bg-BG" dirty="0" smtClean="0"/>
+              <a:t>ПРЕДСТАВЛЯВАТ ПРЕДВАРИТЕЛНО ЗАДАДЕНИ ФУНКЦИИ, КОИТО ИЗПЪЛНЯВАТ ПРИ ОПРЕДЕЛНИ ОБСТОЯТЕЛСТВА И СА ПРЯКО СВЪРЗАНИ СЪС СЪСТОЯНИЕТО НА ОБЕКТА:</a:t>
+            </a:r>
+          </a:p>
+          <a:p>
+            <a:pPr marL="457200" indent="-457200">
+              <a:buAutoNum type="arabicParenR"/>
+            </a:pPr>
+            <a:r>
+              <a:rPr lang="bg-BG" dirty="0" smtClean="0"/>
+              <a:t>__</a:t>
+            </a:r>
+            <a:r>
+              <a:rPr lang="en-US" dirty="0" smtClean="0"/>
+              <a:t>CONTRUCT – </a:t>
+            </a:r>
+            <a:r>
+              <a:rPr lang="bg-BG" dirty="0" smtClean="0"/>
+              <a:t>ИЗВИКВА СЕ ПРИ КОНСТРУИРАНЕТО НА ОБЕКТА</a:t>
+            </a:r>
+          </a:p>
+          <a:p>
+            <a:pPr marL="457200" indent="-457200">
+              <a:buAutoNum type="arabicParenR"/>
+            </a:pPr>
+            <a:r>
+              <a:rPr lang="bg-BG" dirty="0" smtClean="0"/>
+              <a:t>__</a:t>
+            </a:r>
+            <a:r>
+              <a:rPr lang="en-US" dirty="0" smtClean="0"/>
+              <a:t>DESTRUCT – </a:t>
+            </a:r>
+            <a:r>
+              <a:rPr lang="bg-BG" dirty="0" smtClean="0"/>
+              <a:t>ИЗВИКВА СЕ ПРИ РАЗРУШАВАНЕТО НА ОБЕКТА</a:t>
+            </a:r>
+          </a:p>
+          <a:p>
+            <a:pPr marL="457200" indent="-457200">
+              <a:buAutoNum type="arabicParenR"/>
+            </a:pPr>
+            <a:r>
+              <a:rPr lang="en-US" dirty="0"/>
+              <a:t>__</a:t>
+            </a:r>
+            <a:r>
+              <a:rPr lang="en-US" dirty="0" err="1" smtClean="0"/>
+              <a:t>toString</a:t>
+            </a:r>
+            <a:r>
+              <a:rPr lang="bg-BG" dirty="0" smtClean="0"/>
+              <a:t> – ИВИКВА СЕ КОГАТО ОБЕКТА СЕ УПОТРЕБЯВАКА КАТО </a:t>
+            </a:r>
+            <a:r>
+              <a:rPr lang="en-US" dirty="0" smtClean="0"/>
+              <a:t>STRING</a:t>
+            </a:r>
+          </a:p>
+          <a:p>
+            <a:pPr marL="457200" indent="-457200">
+              <a:buAutoNum type="arabicParenR"/>
+            </a:pPr>
+            <a:r>
+              <a:rPr lang="bg-BG" dirty="0" smtClean="0"/>
+              <a:t>ВСИЧКИ ДРУГИ МАГИЧЕСКИ МЕТОДИ МОЖЕ ДА ВИДИТЕ:</a:t>
+            </a:r>
+          </a:p>
+          <a:p>
+            <a:pPr marL="0" indent="0">
+              <a:buNone/>
+            </a:pPr>
+            <a:r>
+              <a:rPr lang="en-US" dirty="0">
+                <a:hlinkClick r:id="rId2"/>
+              </a:rPr>
+              <a:t>http://</a:t>
+            </a:r>
+            <a:r>
+              <a:rPr lang="en-US" dirty="0" smtClean="0">
+                <a:hlinkClick r:id="rId2"/>
+              </a:rPr>
+              <a:t>php.net/manual/en/language.oop5.magic.ph</a:t>
+            </a:r>
+            <a:r>
+              <a:rPr lang="en-US" dirty="0">
+                <a:hlinkClick r:id="rId2"/>
+              </a:rPr>
+              <a:t>P</a:t>
+            </a:r>
+            <a:endParaRPr lang="bg-BG" dirty="0"/>
+          </a:p>
+        </p:txBody>
+      </p:sp>
+    </p:spTree>
+    <p:extLst>
+      <p:ext uri="{BB962C8B-B14F-4D97-AF65-F5344CB8AC3E}">
+        <p14:creationId xmlns:p14="http://schemas.microsoft.com/office/powerpoint/2010/main" val="361548457"/>
+      </p:ext>
+    </p:extLst>
+  </p:cSld>
+  <p:clrMapOvr>
+    <a:masterClrMapping/>
+  </p:clrMapOvr>
+</p:sld>
+</file>
+
+<file path=ppt/slides/slide18.xml><?xml version="1.0" encoding="utf-8"?>
+<p:sld xmlns:a="http://schemas.openxmlformats.org/drawingml/2006/main" xmlns:r="http://schemas.openxmlformats.org/officeDocument/2006/relationships" xmlns:p="http://schemas.openxmlformats.org/presentationml/2006/main">
+  <p:cSld>
+    <p:spTree>
+      <p:nvGrpSpPr>
+        <p:cNvPr id="1" name=""/>
+        <p:cNvGrpSpPr/>
+        <p:nvPr/>
+      </p:nvGrpSpPr>
+      <p:grpSpPr>
+        <a:xfrm>
+          <a:off x="0" y="0"/>
+          <a:ext cx="0" cy="0"/>
+          <a:chOff x="0" y="0"/>
+          <a:chExt cx="0" cy="0"/>
+        </a:xfrm>
+      </p:grpSpPr>
+      <p:sp>
+        <p:nvSpPr>
+          <p:cNvPr id="2" name="Title 1"/>
+          <p:cNvSpPr>
+            <a:spLocks noGrp="1"/>
+          </p:cNvSpPr>
+          <p:nvPr>
+            <p:ph type="title"/>
+          </p:nvPr>
+        </p:nvSpPr>
+        <p:spPr/>
+        <p:txBody>
+          <a:bodyPr/>
+          <a:lstStyle/>
+          <a:p>
+            <a:r>
+              <a:rPr lang="bg-BG" dirty="0"/>
+              <a:t>Магически методи в </a:t>
+            </a:r>
+            <a:r>
+              <a:rPr lang="en-US" dirty="0"/>
+              <a:t>PHP</a:t>
+            </a:r>
+          </a:p>
+        </p:txBody>
+      </p:sp>
+      <p:pic>
+        <p:nvPicPr>
+          <p:cNvPr id="1026" name="Picture 2" descr="https://cdn4.iconfinder.com/data/icons/Presto_iContainer/512/Wand%20%2B%20Cloud.png"/>
+          <p:cNvPicPr>
+            <a:picLocks noChangeAspect="1" noChangeArrowheads="1"/>
+          </p:cNvPicPr>
+          <p:nvPr/>
+        </p:nvPicPr>
+        <p:blipFill>
+          <a:blip r:embed="rId2">
+            <a:extLst>
+              <a:ext uri="{28A0092B-C50C-407E-A947-70E740481C1C}">
+                <a14:useLocalDpi xmlns:a14="http://schemas.microsoft.com/office/drawing/2010/main" val="0"/>
+              </a:ext>
+            </a:extLst>
+          </a:blip>
+          <a:srcRect/>
+          <a:stretch>
+            <a:fillRect/>
+          </a:stretch>
+        </p:blipFill>
+        <p:spPr bwMode="auto">
+          <a:xfrm>
+            <a:off x="3812245" y="2214694"/>
+            <a:ext cx="4567510" cy="4567511"/>
+          </a:xfrm>
+          <a:prstGeom prst="rect">
+            <a:avLst/>
+          </a:prstGeom>
+          <a:noFill/>
+          <a:extLst>
+            <a:ext uri="{909E8E84-426E-40DD-AFC4-6F175D3DCCD1}">
+              <a14:hiddenFill xmlns:a14="http://schemas.microsoft.com/office/drawing/2010/main">
+                <a:solidFill>
+                  <a:srgbClr val="FFFFFF"/>
+                </a:solidFill>
+              </a14:hiddenFill>
+            </a:ext>
+          </a:extLst>
+        </p:spPr>
+      </p:pic>
+    </p:spTree>
+    <p:extLst>
+      <p:ext uri="{BB962C8B-B14F-4D97-AF65-F5344CB8AC3E}">
+        <p14:creationId xmlns:p14="http://schemas.microsoft.com/office/powerpoint/2010/main" val="4118286339"/>
+      </p:ext>
+    </p:extLst>
+  </p:cSld>
+  <p:clrMapOvr>
+    <a:masterClrMapping/>
+  </p:clrMapOvr>
+</p:sld>
+</file>
+
+<file path=ppt/slides/slide19.xml><?xml version="1.0" encoding="utf-8"?>
+<p:sld xmlns:a="http://schemas.openxmlformats.org/drawingml/2006/main" xmlns:r="http://schemas.openxmlformats.org/officeDocument/2006/relationships" xmlns:p="http://schemas.openxmlformats.org/presentationml/2006/main">
+  <p:cSld>
+    <p:spTree>
+      <p:nvGrpSpPr>
+        <p:cNvPr id="1" name=""/>
+        <p:cNvGrpSpPr/>
+        <p:nvPr/>
+      </p:nvGrpSpPr>
+      <p:grpSpPr>
+        <a:xfrm>
+          <a:off x="0" y="0"/>
+          <a:ext cx="0" cy="0"/>
+          <a:chOff x="0" y="0"/>
+          <a:chExt cx="0" cy="0"/>
+        </a:xfrm>
+      </p:grpSpPr>
+      <p:sp>
+        <p:nvSpPr>
+          <p:cNvPr id="2" name="Title 1"/>
+          <p:cNvSpPr>
+            <a:spLocks noGrp="1"/>
+          </p:cNvSpPr>
+          <p:nvPr>
+            <p:ph type="title"/>
+          </p:nvPr>
+        </p:nvSpPr>
+        <p:spPr/>
+        <p:txBody>
+          <a:bodyPr/>
+          <a:lstStyle/>
+          <a:p>
+            <a:r>
+              <a:rPr lang="bg-BG" dirty="0"/>
+              <a:t>задача</a:t>
+            </a:r>
+            <a:endParaRPr lang="en-US" dirty="0"/>
+          </a:p>
+        </p:txBody>
+      </p:sp>
+      <p:sp>
+        <p:nvSpPr>
+          <p:cNvPr id="3" name="Content Placeholder 2"/>
+          <p:cNvSpPr>
+            <a:spLocks noGrp="1"/>
+          </p:cNvSpPr>
+          <p:nvPr>
+            <p:ph sz="quarter" idx="13"/>
+          </p:nvPr>
+        </p:nvSpPr>
+        <p:spPr>
+          <a:xfrm>
+            <a:off x="913774" y="2367092"/>
+            <a:ext cx="10363826" cy="3502485"/>
+          </a:xfrm>
+        </p:spPr>
+        <p:txBody>
+          <a:bodyPr>
+            <a:normAutofit fontScale="92500" lnSpcReduction="10000"/>
+          </a:bodyPr>
+          <a:lstStyle/>
+          <a:p>
+            <a:r>
+              <a:rPr lang="bg-BG" dirty="0"/>
+              <a:t>Създайте абстрактен клас </a:t>
+            </a:r>
+            <a:r>
+              <a:rPr lang="en-US" dirty="0"/>
+              <a:t>HUMAN </a:t>
+            </a:r>
+            <a:r>
+              <a:rPr lang="bg-BG" dirty="0"/>
+              <a:t>съдържащ поле за име и един абстрактен метод </a:t>
+            </a:r>
+            <a:r>
+              <a:rPr lang="en-US" dirty="0"/>
+              <a:t>identify. </a:t>
+            </a:r>
+          </a:p>
+          <a:p>
+            <a:r>
+              <a:rPr lang="bg-BG" dirty="0"/>
+              <a:t>Създайте клас </a:t>
+            </a:r>
+            <a:r>
+              <a:rPr lang="en-US" dirty="0"/>
+              <a:t>Student</a:t>
+            </a:r>
+            <a:r>
+              <a:rPr lang="bg-BG" dirty="0"/>
+              <a:t> който наследява </a:t>
+            </a:r>
+            <a:r>
+              <a:rPr lang="en-US" dirty="0"/>
+              <a:t>Human </a:t>
+            </a:r>
+            <a:r>
+              <a:rPr lang="bg-BG" dirty="0"/>
+              <a:t>и съдържа полета за университет и специалност</a:t>
+            </a:r>
+          </a:p>
+          <a:p>
+            <a:r>
+              <a:rPr lang="bg-BG" dirty="0"/>
+              <a:t>Създайте клас </a:t>
+            </a:r>
+            <a:r>
+              <a:rPr lang="en-US" dirty="0"/>
+              <a:t>Employee </a:t>
+            </a:r>
+            <a:r>
+              <a:rPr lang="bg-BG" dirty="0"/>
+              <a:t>който наследява </a:t>
+            </a:r>
+            <a:r>
+              <a:rPr lang="en-US" dirty="0"/>
+              <a:t>Human </a:t>
+            </a:r>
+            <a:r>
+              <a:rPr lang="bg-BG" dirty="0"/>
+              <a:t>и съдържа полета за месторабота и месечна заплата</a:t>
+            </a:r>
+          </a:p>
+          <a:p>
+            <a:r>
+              <a:rPr lang="bg-BG" dirty="0"/>
+              <a:t>Създайте клас </a:t>
+            </a:r>
+            <a:r>
+              <a:rPr lang="en-US" dirty="0"/>
+              <a:t>Pensioner</a:t>
+            </a:r>
+            <a:r>
+              <a:rPr lang="bg-BG" dirty="0"/>
+              <a:t> който наследява </a:t>
+            </a:r>
+            <a:r>
+              <a:rPr lang="en-US" dirty="0"/>
+              <a:t>Human </a:t>
+            </a:r>
+            <a:r>
+              <a:rPr lang="bg-BG" dirty="0"/>
+              <a:t>и съдържа поле за пенсия</a:t>
+            </a:r>
+          </a:p>
+          <a:p>
+            <a:r>
+              <a:rPr lang="bg-BG" dirty="0"/>
+              <a:t>И в трите класа дайте различна имплементация на метода </a:t>
+            </a:r>
+            <a:r>
+              <a:rPr lang="en-US" dirty="0" err="1"/>
+              <a:t>indentify</a:t>
+            </a:r>
+            <a:r>
+              <a:rPr lang="bg-BG" dirty="0"/>
+              <a:t> като изкарвате информация за съответния обект в конзолата</a:t>
+            </a:r>
+            <a:endParaRPr lang="en-US" dirty="0"/>
+          </a:p>
+          <a:p>
+            <a:pPr marL="0" indent="0">
+              <a:buNone/>
+            </a:pPr>
+            <a:endParaRPr lang="en-US" dirty="0"/>
+          </a:p>
+        </p:txBody>
+      </p:sp>
+    </p:spTree>
+    <p:extLst>
+      <p:ext uri="{BB962C8B-B14F-4D97-AF65-F5344CB8AC3E}">
+        <p14:creationId xmlns:p14="http://schemas.microsoft.com/office/powerpoint/2010/main" val="3538216029"/>
       </p:ext>
     </p:extLst>
   </p:cSld>
@@ -6782,6 +8034,100 @@
     <p:extLst>
       <p:ext uri="{BB962C8B-B14F-4D97-AF65-F5344CB8AC3E}">
         <p14:creationId xmlns:p14="http://schemas.microsoft.com/office/powerpoint/2010/main" val="1683846100"/>
+      </p:ext>
+    </p:extLst>
+  </p:cSld>
+  <p:clrMapOvr>
+    <a:masterClrMapping/>
+  </p:clrMapOvr>
+</p:sld>
+</file>
+
+<file path=ppt/slides/slide20.xml><?xml version="1.0" encoding="utf-8"?>
+<p:sld xmlns:a="http://schemas.openxmlformats.org/drawingml/2006/main" xmlns:r="http://schemas.openxmlformats.org/officeDocument/2006/relationships" xmlns:p="http://schemas.openxmlformats.org/presentationml/2006/main">
+  <p:cSld>
+    <p:spTree>
+      <p:nvGrpSpPr>
+        <p:cNvPr id="1" name=""/>
+        <p:cNvGrpSpPr/>
+        <p:nvPr/>
+      </p:nvGrpSpPr>
+      <p:grpSpPr>
+        <a:xfrm>
+          <a:off x="0" y="0"/>
+          <a:ext cx="0" cy="0"/>
+          <a:chOff x="0" y="0"/>
+          <a:chExt cx="0" cy="0"/>
+        </a:xfrm>
+      </p:grpSpPr>
+      <p:sp>
+        <p:nvSpPr>
+          <p:cNvPr id="2" name="Title 1"/>
+          <p:cNvSpPr>
+            <a:spLocks noGrp="1"/>
+          </p:cNvSpPr>
+          <p:nvPr>
+            <p:ph type="title"/>
+          </p:nvPr>
+        </p:nvSpPr>
+        <p:spPr/>
+        <p:txBody>
+          <a:bodyPr/>
+          <a:lstStyle/>
+          <a:p>
+            <a:r>
+              <a:rPr lang="bg-BG" dirty="0"/>
+              <a:t>Въпроси</a:t>
+            </a:r>
+            <a:endParaRPr lang="en-US" dirty="0"/>
+          </a:p>
+        </p:txBody>
+      </p:sp>
+      <p:pic>
+        <p:nvPicPr>
+          <p:cNvPr id="4" name="Picture 2" descr="http://en.hdyo.org/assets/ask-question-1-ff9bc6fa5eaa0d7667ae7a5a4c61330c.jpg"/>
+          <p:cNvPicPr>
+            <a:picLocks noChangeAspect="1" noChangeArrowheads="1"/>
+          </p:cNvPicPr>
+          <p:nvPr/>
+        </p:nvPicPr>
+        <p:blipFill>
+          <a:blip r:embed="rId2">
+            <a:extLst>
+              <a:ext uri="{28A0092B-C50C-407E-A947-70E740481C1C}">
+                <a14:useLocalDpi xmlns:a14="http://schemas.microsoft.com/office/drawing/2010/main" val="0"/>
+              </a:ext>
+            </a:extLst>
+          </a:blip>
+          <a:srcRect/>
+          <a:stretch>
+            <a:fillRect/>
+          </a:stretch>
+        </p:blipFill>
+        <p:spPr bwMode="auto">
+          <a:xfrm>
+            <a:off x="3317231" y="2097088"/>
+            <a:ext cx="5554362" cy="4199097"/>
+          </a:xfrm>
+          <a:prstGeom prst="rect">
+            <a:avLst/>
+          </a:prstGeom>
+          <a:noFill/>
+          <a:extLst>
+            <a:ext uri="{909E8E84-426E-40DD-AFC4-6F175D3DCCD1}">
+              <a14:hiddenFill xmlns:a14="http://schemas.microsoft.com/office/drawing/2010/main">
+                <a:solidFill>
+                  <a:srgbClr val="FFFFFF"/>
+                </a:solidFill>
+              </a14:hiddenFill>
+            </a:ext>
+          </a:extLst>
+        </p:spPr>
+      </p:pic>
+    </p:spTree>
+    <p:extLst>
+      <p:ext uri="{BB962C8B-B14F-4D97-AF65-F5344CB8AC3E}">
+        <p14:creationId xmlns:p14="http://schemas.microsoft.com/office/powerpoint/2010/main" val="374092269"/>
       </p:ext>
     </p:extLst>
   </p:cSld>

</xml_diff>